<commit_message>
add using rdf grapher
</commit_message>
<xml_diff>
--- a/ontology-practice.pptx
+++ b/ontology-practice.pptx
@@ -11,9 +11,9 @@
     <p:handoutMasterId r:id="rId19"/>
   </p:handoutMasterIdLst>
   <p:sldIdLst>
-    <p:sldId id="278" r:id="rId5"/>
+    <p:sldId id="271" r:id="rId5"/>
     <p:sldId id="282" r:id="rId6"/>
-    <p:sldId id="271" r:id="rId7"/>
+    <p:sldId id="278" r:id="rId7"/>
     <p:sldId id="283" r:id="rId8"/>
     <p:sldId id="284" r:id="rId9"/>
     <p:sldId id="285" r:id="rId10"/>
@@ -238,7 +238,7 @@
           <a:p>
             <a:fld id="{717BC71B-6527-4638-937B-C93EB849CB02}" type="datetimeFigureOut">
               <a:rPr lang="en-US" smtClean="0"/>
-              <a:t>9/20/2024</a:t>
+              <a:t>9/29/2024</a:t>
             </a:fld>
             <a:endParaRPr lang="en-US" dirty="0"/>
           </a:p>
@@ -415,7 +415,7 @@
           <a:p>
             <a:fld id="{425465A2-8C9C-419F-9FD8-234480873777}" type="datetimeFigureOut">
               <a:rPr lang="en-US" smtClean="0"/>
-              <a:t>9/20/2024</a:t>
+              <a:t>9/29/2024</a:t>
             </a:fld>
             <a:endParaRPr lang="en-US" dirty="0"/>
           </a:p>
@@ -756,7 +756,7 @@
     </p:spTree>
     <p:extLst>
       <p:ext uri="{BB962C8B-B14F-4D97-AF65-F5344CB8AC3E}">
-        <p14:creationId xmlns:p14="http://schemas.microsoft.com/office/powerpoint/2010/main" val="2189223756"/>
+        <p14:creationId xmlns:p14="http://schemas.microsoft.com/office/powerpoint/2010/main" val="603191752"/>
       </p:ext>
     </p:extLst>
   </p:cSld>
@@ -924,7 +924,7 @@
     </p:spTree>
     <p:extLst>
       <p:ext uri="{BB962C8B-B14F-4D97-AF65-F5344CB8AC3E}">
-        <p14:creationId xmlns:p14="http://schemas.microsoft.com/office/powerpoint/2010/main" val="603191752"/>
+        <p14:creationId xmlns:p14="http://schemas.microsoft.com/office/powerpoint/2010/main" val="2189223756"/>
       </p:ext>
     </p:extLst>
   </p:cSld>
@@ -18673,10 +18673,10 @@
       </p:grpSpPr>
       <p:sp>
         <p:nvSpPr>
-          <p:cNvPr id="4" name="Title 3">
+          <p:cNvPr id="3" name="Title 2">
             <a:extLst>
               <a:ext uri="{FF2B5EF4-FFF2-40B4-BE49-F238E27FC236}">
-                <a16:creationId xmlns:a16="http://schemas.microsoft.com/office/drawing/2014/main" id="{10047101-8D42-6100-9CEA-AEC0FAEAB606}"/>
+                <a16:creationId xmlns:a16="http://schemas.microsoft.com/office/drawing/2014/main" id="{A0034E89-1952-5288-08A0-70A4A73BE39E}"/>
               </a:ext>
             </a:extLst>
           </p:cNvPr>
@@ -18684,20 +18684,14 @@
             <a:spLocks noGrp="1"/>
           </p:cNvSpPr>
           <p:nvPr>
-            <p:ph type="title"/>
+            <p:ph type="ctrTitle"/>
           </p:nvPr>
         </p:nvSpPr>
         <p:spPr>
-          <a:xfrm>
-            <a:off x="7018020" y="662937"/>
-            <a:ext cx="4624442" cy="2221665"/>
-          </a:xfrm>
           <a:noFill/>
         </p:spPr>
         <p:txBody>
-          <a:bodyPr anchor="ctr">
-            <a:noAutofit/>
-          </a:bodyPr>
+          <a:bodyPr anchor="ctr"/>
           <a:lstStyle/>
           <a:p>
             <a:r>
@@ -18706,7 +18700,26 @@
                 <a:ea typeface="ADLaM Display" panose="02010000000000000000" pitchFamily="2" charset="0"/>
                 <a:cs typeface="ADLaM Display" panose="02010000000000000000" pitchFamily="2" charset="0"/>
               </a:rPr>
-              <a:t>Ontology View of LeanIX Meta-Model V4</a:t>
+              <a:t>Use “</a:t>
+            </a:r>
+            <a:r>
+              <a:rPr lang="en-US" altLang="zh-CN" dirty="0">
+                <a:solidFill>
+                  <a:srgbClr val="FFFF00"/>
+                </a:solidFill>
+                <a:latin typeface="ADLaM Display" panose="02010000000000000000" pitchFamily="2" charset="0"/>
+                <a:ea typeface="ADLaM Display" panose="02010000000000000000" pitchFamily="2" charset="0"/>
+                <a:cs typeface="ADLaM Display" panose="02010000000000000000" pitchFamily="2" charset="0"/>
+              </a:rPr>
+              <a:t>RDF Grapher</a:t>
+            </a:r>
+            <a:r>
+              <a:rPr lang="en-US" altLang="zh-CN" dirty="0">
+                <a:latin typeface="ADLaM Display" panose="02010000000000000000" pitchFamily="2" charset="0"/>
+                <a:ea typeface="ADLaM Display" panose="02010000000000000000" pitchFamily="2" charset="0"/>
+                <a:cs typeface="ADLaM Display" panose="02010000000000000000" pitchFamily="2" charset="0"/>
+              </a:rPr>
+              <a:t>” to Visualize Your Ontology</a:t>
             </a:r>
             <a:endParaRPr lang="en-US" dirty="0">
               <a:latin typeface="ADLaM Display" panose="02010000000000000000" pitchFamily="2" charset="0"/>
@@ -18718,10 +18731,10 @@
       </p:sp>
       <p:pic>
         <p:nvPicPr>
-          <p:cNvPr id="8" name="Picture Placeholder 13" descr="Data points digital background">
+          <p:cNvPr id="11" name="Picture Placeholder 15" descr="Data points digital background">
             <a:extLst>
               <a:ext uri="{FF2B5EF4-FFF2-40B4-BE49-F238E27FC236}">
-                <a16:creationId xmlns:a16="http://schemas.microsoft.com/office/drawing/2014/main" id="{53227D59-33F9-9DDB-1C5C-A938A989EE51}"/>
+                <a16:creationId xmlns:a16="http://schemas.microsoft.com/office/drawing/2014/main" id="{A496DCE5-C34A-22C2-A9D8-E90DFC8CE86C}"/>
               </a:ext>
             </a:extLst>
           </p:cNvPr>
@@ -18740,17 +18753,17 @@
               </a:ext>
             </a:extLst>
           </a:blip>
-          <a:srcRect l="7936" r="7936"/>
+          <a:srcRect t="52" b="52"/>
           <a:stretch/>
         </p:blipFill>
         <p:spPr/>
       </p:pic>
       <p:pic>
         <p:nvPicPr>
-          <p:cNvPr id="3" name="Picture 2">
+          <p:cNvPr id="4" name="Picture 3">
             <a:extLst>
               <a:ext uri="{FF2B5EF4-FFF2-40B4-BE49-F238E27FC236}">
-                <a16:creationId xmlns:a16="http://schemas.microsoft.com/office/drawing/2014/main" id="{F8D3276F-85B5-0B8C-C376-361D86C063A8}"/>
+                <a16:creationId xmlns:a16="http://schemas.microsoft.com/office/drawing/2014/main" id="{B91FD6D6-229F-20CF-757B-D432F2804FB8}"/>
               </a:ext>
             </a:extLst>
           </p:cNvPr>
@@ -18767,8 +18780,46 @@
         </p:blipFill>
         <p:spPr>
           <a:xfrm>
-            <a:off x="7373422" y="2884602"/>
-            <a:ext cx="3913637" cy="3488430"/>
+            <a:off x="356143" y="938480"/>
+            <a:ext cx="2979358" cy="2674384"/>
+          </a:xfrm>
+          <a:prstGeom prst="rect">
+            <a:avLst/>
+          </a:prstGeom>
+          <a:ln>
+            <a:noFill/>
+          </a:ln>
+          <a:effectLst>
+            <a:softEdge rad="112500"/>
+          </a:effectLst>
+        </p:spPr>
+      </p:pic>
+      <p:pic>
+        <p:nvPicPr>
+          <p:cNvPr id="6" name="Picture 5">
+            <a:extLst>
+              <a:ext uri="{FF2B5EF4-FFF2-40B4-BE49-F238E27FC236}">
+                <a16:creationId xmlns:a16="http://schemas.microsoft.com/office/drawing/2014/main" id="{CA92E1BF-98F0-DD64-BDC0-49A04AB78B94}"/>
+              </a:ext>
+            </a:extLst>
+          </p:cNvPr>
+          <p:cNvPicPr>
+            <a:picLocks noChangeAspect="1"/>
+          </p:cNvPicPr>
+          <p:nvPr/>
+        </p:nvPicPr>
+        <p:blipFill>
+          <a:blip r:embed="rId5">
+            <a:alphaModFix amt="70000"/>
+          </a:blip>
+          <a:stretch>
+            <a:fillRect/>
+          </a:stretch>
+        </p:blipFill>
+        <p:spPr>
+          <a:xfrm>
+            <a:off x="3512834" y="429721"/>
+            <a:ext cx="8501833" cy="3691903"/>
           </a:xfrm>
           <a:prstGeom prst="rect">
             <a:avLst/>
@@ -18785,131 +18836,45 @@
           </a:effectLst>
         </p:spPr>
       </p:pic>
-      <p:pic>
-        <p:nvPicPr>
-          <p:cNvPr id="6" name="Picture 5">
+      <p:sp>
+        <p:nvSpPr>
+          <p:cNvPr id="7" name="TextBox 6">
             <a:extLst>
               <a:ext uri="{FF2B5EF4-FFF2-40B4-BE49-F238E27FC236}">
-                <a16:creationId xmlns:a16="http://schemas.microsoft.com/office/drawing/2014/main" id="{4E474233-C73F-2596-24B3-F91974373256}"/>
+                <a16:creationId xmlns:a16="http://schemas.microsoft.com/office/drawing/2014/main" id="{791C2FFF-EF4E-3F3B-81F2-E1C8ECD586EE}"/>
               </a:ext>
             </a:extLst>
           </p:cNvPr>
-          <p:cNvPicPr>
-            <a:picLocks noChangeAspect="1"/>
-          </p:cNvPicPr>
+          <p:cNvSpPr txBox="1"/>
           <p:nvPr/>
-        </p:nvPicPr>
-        <p:blipFill>
-          <a:blip r:embed="rId5"/>
-          <a:stretch>
-            <a:fillRect/>
-          </a:stretch>
-        </p:blipFill>
+        </p:nvSpPr>
         <p:spPr>
           <a:xfrm>
-            <a:off x="1132659" y="576242"/>
-            <a:ext cx="3543234" cy="1104385"/>
+            <a:off x="4965290" y="6331464"/>
+            <a:ext cx="1787028" cy="369332"/>
           </a:xfrm>
           <a:prstGeom prst="rect">
             <a:avLst/>
           </a:prstGeom>
-          <a:ln>
-            <a:noFill/>
-          </a:ln>
-          <a:effectLst>
-            <a:outerShdw blurRad="292100" dist="139700" dir="2700000" algn="tl" rotWithShape="0">
-              <a:srgbClr val="333333">
-                <a:alpha val="65000"/>
-              </a:srgbClr>
-            </a:outerShdw>
-          </a:effectLst>
+          <a:noFill/>
         </p:spPr>
-      </p:pic>
-      <p:pic>
-        <p:nvPicPr>
-          <p:cNvPr id="9" name="Picture 8">
-            <a:extLst>
-              <a:ext uri="{FF2B5EF4-FFF2-40B4-BE49-F238E27FC236}">
-                <a16:creationId xmlns:a16="http://schemas.microsoft.com/office/drawing/2014/main" id="{B309CF23-4D78-9DCE-4A8D-6C67D2CAF244}"/>
-              </a:ext>
-            </a:extLst>
-          </p:cNvPr>
-          <p:cNvPicPr>
-            <a:picLocks noChangeAspect="1"/>
-          </p:cNvPicPr>
-          <p:nvPr/>
-        </p:nvPicPr>
-        <p:blipFill>
-          <a:blip r:embed="rId6"/>
-          <a:stretch>
-            <a:fillRect/>
-          </a:stretch>
-        </p:blipFill>
-        <p:spPr>
-          <a:xfrm>
-            <a:off x="1130301" y="4746850"/>
-            <a:ext cx="3543234" cy="1362232"/>
-          </a:xfrm>
-          <a:prstGeom prst="rect">
-            <a:avLst/>
-          </a:prstGeom>
-          <a:ln>
-            <a:noFill/>
-          </a:ln>
-          <a:effectLst>
-            <a:outerShdw blurRad="292100" dist="139700" dir="2700000" algn="tl" rotWithShape="0">
-              <a:srgbClr val="333333">
-                <a:alpha val="65000"/>
-              </a:srgbClr>
-            </a:outerShdw>
-          </a:effectLst>
-        </p:spPr>
-      </p:pic>
-      <p:pic>
-        <p:nvPicPr>
-          <p:cNvPr id="11" name="Picture 10">
-            <a:extLst>
-              <a:ext uri="{FF2B5EF4-FFF2-40B4-BE49-F238E27FC236}">
-                <a16:creationId xmlns:a16="http://schemas.microsoft.com/office/drawing/2014/main" id="{1FD93B8B-C15F-3BE8-E492-1F9DA8196A77}"/>
-              </a:ext>
-            </a:extLst>
-          </p:cNvPr>
-          <p:cNvPicPr>
-            <a:picLocks noChangeAspect="1"/>
-          </p:cNvPicPr>
-          <p:nvPr/>
-        </p:nvPicPr>
-        <p:blipFill>
-          <a:blip r:embed="rId7">
-            <a:clrChange>
-              <a:clrFrom>
-                <a:srgbClr val="FFFFFF"/>
-              </a:clrFrom>
-              <a:clrTo>
-                <a:srgbClr val="FFFFFF">
-                  <a:alpha val="0"/>
-                </a:srgbClr>
-              </a:clrTo>
-            </a:clrChange>
-          </a:blip>
-          <a:stretch>
-            <a:fillRect/>
-          </a:stretch>
-        </p:blipFill>
-        <p:spPr>
-          <a:xfrm>
-            <a:off x="315987" y="2072911"/>
-            <a:ext cx="5635475" cy="2153322"/>
-          </a:xfrm>
-          <a:prstGeom prst="rect">
-            <a:avLst/>
-          </a:prstGeom>
-        </p:spPr>
-      </p:pic>
+        <p:txBody>
+          <a:bodyPr wrap="none" rtlCol="0">
+            <a:spAutoFit/>
+          </a:bodyPr>
+          <a:lstStyle/>
+          <a:p>
+            <a:r>
+              <a:rPr lang="en-US" dirty="0"/>
+              <a:t>Date: 2024/09/29</a:t>
+            </a:r>
+          </a:p>
+        </p:txBody>
+      </p:sp>
     </p:spTree>
     <p:extLst>
       <p:ext uri="{BB962C8B-B14F-4D97-AF65-F5344CB8AC3E}">
-        <p14:creationId xmlns:p14="http://schemas.microsoft.com/office/powerpoint/2010/main" val="2803092014"/>
+        <p14:creationId xmlns:p14="http://schemas.microsoft.com/office/powerpoint/2010/main" val="1839748091"/>
       </p:ext>
     </p:extLst>
   </p:cSld>
@@ -20483,14 +20448,19 @@
             <p:ph type="title"/>
           </p:nvPr>
         </p:nvSpPr>
-        <p:spPr/>
+        <p:spPr>
+          <a:xfrm>
+            <a:off x="550863" y="483925"/>
+            <a:ext cx="11090275" cy="1067372"/>
+          </a:xfrm>
+        </p:spPr>
         <p:txBody>
           <a:bodyPr/>
           <a:lstStyle/>
           <a:p>
             <a:r>
               <a:rPr lang="en-US" dirty="0"/>
-              <a:t>Agenda</a:t>
+              <a:t>Contents</a:t>
             </a:r>
           </a:p>
         </p:txBody>
@@ -20511,44 +20481,123 @@
             <p:ph sz="quarter" idx="13"/>
           </p:nvPr>
         </p:nvSpPr>
-        <p:spPr/>
+        <p:spPr>
+          <a:xfrm>
+            <a:off x="550863" y="1824251"/>
+            <a:ext cx="11090274" cy="4508287"/>
+          </a:xfrm>
+        </p:spPr>
         <p:txBody>
           <a:bodyPr>
             <a:normAutofit/>
           </a:bodyPr>
           <a:lstStyle/>
           <a:p>
+            <a:pPr marL="457200" indent="-457200">
+              <a:buFont typeface="Arial" panose="020B0604020202020204" pitchFamily="34" charset="0"/>
+              <a:buChar char="•"/>
+            </a:pPr>
             <a:r>
-              <a:rPr lang="en-US" dirty="0"/>
-              <a:t>Introduction</a:t>
+              <a:rPr lang="en-US" sz="2800" dirty="0"/>
+              <a:t>Introduction on RDF Grapher</a:t>
             </a:r>
           </a:p>
           <a:p>
+            <a:pPr marL="457200" indent="-457200">
+              <a:buFont typeface="Arial" panose="020B0604020202020204" pitchFamily="34" charset="0"/>
+              <a:buChar char="•"/>
+            </a:pPr>
             <a:r>
-              <a:rPr lang="en-US" dirty="0"/>
-              <a:t>Building confidence</a:t>
+              <a:rPr lang="en-US" sz="2800" dirty="0"/>
+              <a:t>Parameters in the Service: </a:t>
             </a:r>
-          </a:p>
-          <a:p>
             <a:r>
-              <a:rPr lang="en-US" dirty="0"/>
-              <a:t>Engaging the audience</a:t>
+              <a:rPr lang="en-US" sz="2800" dirty="0" err="1"/>
+              <a:t>rdf</a:t>
             </a:r>
-          </a:p>
-          <a:p>
             <a:r>
-              <a:rPr lang="en-US" dirty="0"/>
-              <a:t>Visual aids</a:t>
+              <a:rPr lang="en-US" sz="2800" dirty="0"/>
+              <a:t>, from, to</a:t>
             </a:r>
           </a:p>
           <a:p>
+            <a:pPr marL="457200" indent="-457200">
+              <a:buFont typeface="Arial" panose="020B0604020202020204" pitchFamily="34" charset="0"/>
+              <a:buChar char="•"/>
+            </a:pPr>
             <a:r>
-              <a:rPr lang="en-US" dirty="0"/>
-              <a:t>Final tips &amp; takeaways</a:t>
+              <a:rPr lang="en-US" sz="2800" dirty="0"/>
+              <a:t>Demo in </a:t>
+            </a:r>
+            <a:r>
+              <a:rPr lang="en-US" sz="2800" dirty="0">
+                <a:hlinkClick r:id="rId3"/>
+              </a:rPr>
+              <a:t>https://www.ldf.fi/service/rdf-grapher</a:t>
+            </a:r>
+            <a:r>
+              <a:rPr lang="en-US" sz="2800" dirty="0"/>
+              <a:t> web page directly</a:t>
+            </a:r>
+          </a:p>
+          <a:p>
+            <a:pPr marL="457200" indent="-457200">
+              <a:buFont typeface="Arial" panose="020B0604020202020204" pitchFamily="34" charset="0"/>
+              <a:buChar char="•"/>
+            </a:pPr>
+            <a:r>
+              <a:rPr lang="en-US" sz="2800" dirty="0"/>
+              <a:t>Demo in Postman</a:t>
+            </a:r>
+          </a:p>
+          <a:p>
+            <a:pPr marL="457200" indent="-457200">
+              <a:buFont typeface="Arial" panose="020B0604020202020204" pitchFamily="34" charset="0"/>
+              <a:buChar char="•"/>
+            </a:pPr>
+            <a:r>
+              <a:rPr lang="en-US" sz="2800" dirty="0"/>
+              <a:t>Choose GET or POST?</a:t>
             </a:r>
           </a:p>
         </p:txBody>
       </p:sp>
+      <p:pic>
+        <p:nvPicPr>
+          <p:cNvPr id="4" name="Picture 3">
+            <a:extLst>
+              <a:ext uri="{FF2B5EF4-FFF2-40B4-BE49-F238E27FC236}">
+                <a16:creationId xmlns:a16="http://schemas.microsoft.com/office/drawing/2014/main" id="{10EC9BF6-CD78-4F0A-B46C-6D0213F81CC6}"/>
+              </a:ext>
+            </a:extLst>
+          </p:cNvPr>
+          <p:cNvPicPr>
+            <a:picLocks noChangeAspect="1"/>
+          </p:cNvPicPr>
+          <p:nvPr/>
+        </p:nvPicPr>
+        <p:blipFill>
+          <a:blip r:embed="rId4"/>
+          <a:stretch>
+            <a:fillRect/>
+          </a:stretch>
+        </p:blipFill>
+        <p:spPr>
+          <a:xfrm>
+            <a:off x="7612202" y="415316"/>
+            <a:ext cx="2979358" cy="2674384"/>
+          </a:xfrm>
+          <a:prstGeom prst="rect">
+            <a:avLst/>
+          </a:prstGeom>
+          <a:ln>
+            <a:noFill/>
+          </a:ln>
+          <a:effectLst>
+            <a:softEdge rad="112500"/>
+          </a:effectLst>
+        </p:spPr>
+      </p:pic>
     </p:spTree>
     <p:extLst>
       <p:ext uri="{BB962C8B-B14F-4D97-AF65-F5344CB8AC3E}">
@@ -20581,10 +20630,10 @@
       </p:grpSpPr>
       <p:sp>
         <p:nvSpPr>
-          <p:cNvPr id="3" name="Title 2">
+          <p:cNvPr id="4" name="Title 3">
             <a:extLst>
               <a:ext uri="{FF2B5EF4-FFF2-40B4-BE49-F238E27FC236}">
-                <a16:creationId xmlns:a16="http://schemas.microsoft.com/office/drawing/2014/main" id="{A0034E89-1952-5288-08A0-70A4A73BE39E}"/>
+                <a16:creationId xmlns:a16="http://schemas.microsoft.com/office/drawing/2014/main" id="{10047101-8D42-6100-9CEA-AEC0FAEAB606}"/>
               </a:ext>
             </a:extLst>
           </p:cNvPr>
@@ -20592,29 +20641,44 @@
             <a:spLocks noGrp="1"/>
           </p:cNvSpPr>
           <p:nvPr>
-            <p:ph type="ctrTitle"/>
+            <p:ph type="title"/>
           </p:nvPr>
         </p:nvSpPr>
         <p:spPr>
+          <a:xfrm>
+            <a:off x="7018020" y="662937"/>
+            <a:ext cx="4624442" cy="2221665"/>
+          </a:xfrm>
           <a:noFill/>
         </p:spPr>
         <p:txBody>
-          <a:bodyPr anchor="ctr"/>
+          <a:bodyPr anchor="ctr">
+            <a:noAutofit/>
+          </a:bodyPr>
           <a:lstStyle/>
           <a:p>
             <a:r>
-              <a:rPr lang="en-US" dirty="0"/>
-              <a:t>The power of communication</a:t>
+              <a:rPr lang="en-US" altLang="zh-CN" dirty="0">
+                <a:latin typeface="ADLaM Display" panose="02010000000000000000" pitchFamily="2" charset="0"/>
+                <a:ea typeface="ADLaM Display" panose="02010000000000000000" pitchFamily="2" charset="0"/>
+                <a:cs typeface="ADLaM Display" panose="02010000000000000000" pitchFamily="2" charset="0"/>
+              </a:rPr>
+              <a:t>Ontology View of LeanIX Meta-Model V4</a:t>
             </a:r>
+            <a:endParaRPr lang="en-US" dirty="0">
+              <a:latin typeface="ADLaM Display" panose="02010000000000000000" pitchFamily="2" charset="0"/>
+              <a:ea typeface="ADLaM Display" panose="02010000000000000000" pitchFamily="2" charset="0"/>
+              <a:cs typeface="ADLaM Display" panose="02010000000000000000" pitchFamily="2" charset="0"/>
+            </a:endParaRPr>
           </a:p>
         </p:txBody>
       </p:sp>
       <p:pic>
         <p:nvPicPr>
-          <p:cNvPr id="11" name="Picture Placeholder 15" descr="Data points digital background">
+          <p:cNvPr id="8" name="Picture Placeholder 13" descr="Data points digital background">
             <a:extLst>
               <a:ext uri="{FF2B5EF4-FFF2-40B4-BE49-F238E27FC236}">
-                <a16:creationId xmlns:a16="http://schemas.microsoft.com/office/drawing/2014/main" id="{A496DCE5-C34A-22C2-A9D8-E90DFC8CE86C}"/>
+                <a16:creationId xmlns:a16="http://schemas.microsoft.com/office/drawing/2014/main" id="{53227D59-33F9-9DDB-1C5C-A938A989EE51}"/>
               </a:ext>
             </a:extLst>
           </p:cNvPr>
@@ -20633,15 +20697,176 @@
               </a:ext>
             </a:extLst>
           </a:blip>
-          <a:srcRect t="52" b="52"/>
+          <a:srcRect l="7936" r="7936"/>
           <a:stretch/>
         </p:blipFill>
         <p:spPr/>
       </p:pic>
+      <p:pic>
+        <p:nvPicPr>
+          <p:cNvPr id="3" name="Picture 2">
+            <a:extLst>
+              <a:ext uri="{FF2B5EF4-FFF2-40B4-BE49-F238E27FC236}">
+                <a16:creationId xmlns:a16="http://schemas.microsoft.com/office/drawing/2014/main" id="{F8D3276F-85B5-0B8C-C376-361D86C063A8}"/>
+              </a:ext>
+            </a:extLst>
+          </p:cNvPr>
+          <p:cNvPicPr>
+            <a:picLocks noChangeAspect="1"/>
+          </p:cNvPicPr>
+          <p:nvPr/>
+        </p:nvPicPr>
+        <p:blipFill>
+          <a:blip r:embed="rId4"/>
+          <a:stretch>
+            <a:fillRect/>
+          </a:stretch>
+        </p:blipFill>
+        <p:spPr>
+          <a:xfrm>
+            <a:off x="7373422" y="2884602"/>
+            <a:ext cx="3913637" cy="3488430"/>
+          </a:xfrm>
+          <a:prstGeom prst="rect">
+            <a:avLst/>
+          </a:prstGeom>
+          <a:ln>
+            <a:noFill/>
+          </a:ln>
+          <a:effectLst>
+            <a:outerShdw blurRad="292100" dist="139700" dir="2700000" algn="tl" rotWithShape="0">
+              <a:srgbClr val="333333">
+                <a:alpha val="65000"/>
+              </a:srgbClr>
+            </a:outerShdw>
+          </a:effectLst>
+        </p:spPr>
+      </p:pic>
+      <p:pic>
+        <p:nvPicPr>
+          <p:cNvPr id="6" name="Picture 5">
+            <a:extLst>
+              <a:ext uri="{FF2B5EF4-FFF2-40B4-BE49-F238E27FC236}">
+                <a16:creationId xmlns:a16="http://schemas.microsoft.com/office/drawing/2014/main" id="{4E474233-C73F-2596-24B3-F91974373256}"/>
+              </a:ext>
+            </a:extLst>
+          </p:cNvPr>
+          <p:cNvPicPr>
+            <a:picLocks noChangeAspect="1"/>
+          </p:cNvPicPr>
+          <p:nvPr/>
+        </p:nvPicPr>
+        <p:blipFill>
+          <a:blip r:embed="rId5"/>
+          <a:stretch>
+            <a:fillRect/>
+          </a:stretch>
+        </p:blipFill>
+        <p:spPr>
+          <a:xfrm>
+            <a:off x="1132659" y="576242"/>
+            <a:ext cx="3543234" cy="1104385"/>
+          </a:xfrm>
+          <a:prstGeom prst="rect">
+            <a:avLst/>
+          </a:prstGeom>
+          <a:ln>
+            <a:noFill/>
+          </a:ln>
+          <a:effectLst>
+            <a:outerShdw blurRad="292100" dist="139700" dir="2700000" algn="tl" rotWithShape="0">
+              <a:srgbClr val="333333">
+                <a:alpha val="65000"/>
+              </a:srgbClr>
+            </a:outerShdw>
+          </a:effectLst>
+        </p:spPr>
+      </p:pic>
+      <p:pic>
+        <p:nvPicPr>
+          <p:cNvPr id="9" name="Picture 8">
+            <a:extLst>
+              <a:ext uri="{FF2B5EF4-FFF2-40B4-BE49-F238E27FC236}">
+                <a16:creationId xmlns:a16="http://schemas.microsoft.com/office/drawing/2014/main" id="{B309CF23-4D78-9DCE-4A8D-6C67D2CAF244}"/>
+              </a:ext>
+            </a:extLst>
+          </p:cNvPr>
+          <p:cNvPicPr>
+            <a:picLocks noChangeAspect="1"/>
+          </p:cNvPicPr>
+          <p:nvPr/>
+        </p:nvPicPr>
+        <p:blipFill>
+          <a:blip r:embed="rId6"/>
+          <a:stretch>
+            <a:fillRect/>
+          </a:stretch>
+        </p:blipFill>
+        <p:spPr>
+          <a:xfrm>
+            <a:off x="1130301" y="4746850"/>
+            <a:ext cx="3543234" cy="1362232"/>
+          </a:xfrm>
+          <a:prstGeom prst="rect">
+            <a:avLst/>
+          </a:prstGeom>
+          <a:ln>
+            <a:noFill/>
+          </a:ln>
+          <a:effectLst>
+            <a:outerShdw blurRad="292100" dist="139700" dir="2700000" algn="tl" rotWithShape="0">
+              <a:srgbClr val="333333">
+                <a:alpha val="65000"/>
+              </a:srgbClr>
+            </a:outerShdw>
+          </a:effectLst>
+        </p:spPr>
+      </p:pic>
+      <p:pic>
+        <p:nvPicPr>
+          <p:cNvPr id="11" name="Picture 10">
+            <a:extLst>
+              <a:ext uri="{FF2B5EF4-FFF2-40B4-BE49-F238E27FC236}">
+                <a16:creationId xmlns:a16="http://schemas.microsoft.com/office/drawing/2014/main" id="{1FD93B8B-C15F-3BE8-E492-1F9DA8196A77}"/>
+              </a:ext>
+            </a:extLst>
+          </p:cNvPr>
+          <p:cNvPicPr>
+            <a:picLocks noChangeAspect="1"/>
+          </p:cNvPicPr>
+          <p:nvPr/>
+        </p:nvPicPr>
+        <p:blipFill>
+          <a:blip r:embed="rId7">
+            <a:clrChange>
+              <a:clrFrom>
+                <a:srgbClr val="FFFFFF"/>
+              </a:clrFrom>
+              <a:clrTo>
+                <a:srgbClr val="FFFFFF">
+                  <a:alpha val="0"/>
+                </a:srgbClr>
+              </a:clrTo>
+            </a:clrChange>
+          </a:blip>
+          <a:stretch>
+            <a:fillRect/>
+          </a:stretch>
+        </p:blipFill>
+        <p:spPr>
+          <a:xfrm>
+            <a:off x="315987" y="2072911"/>
+            <a:ext cx="5635475" cy="2153322"/>
+          </a:xfrm>
+          <a:prstGeom prst="rect">
+            <a:avLst/>
+          </a:prstGeom>
+        </p:spPr>
+      </p:pic>
     </p:spTree>
     <p:extLst>
       <p:ext uri="{BB962C8B-B14F-4D97-AF65-F5344CB8AC3E}">
-        <p14:creationId xmlns:p14="http://schemas.microsoft.com/office/powerpoint/2010/main" val="1839748091"/>
+        <p14:creationId xmlns:p14="http://schemas.microsoft.com/office/powerpoint/2010/main" val="2803092014"/>
       </p:ext>
     </p:extLst>
   </p:cSld>
@@ -22789,6 +23014,35 @@
 </file>
 
 <file path=customXml/item1.xml><?xml version="1.0" encoding="utf-8"?>
+<?mso-contentType ?>
+<FormTemplates xmlns="http://schemas.microsoft.com/sharepoint/v3/contenttype/forms">
+  <Display>DocumentLibraryForm</Display>
+  <Edit>DocumentLibraryForm</Edit>
+  <New>DocumentLibraryForm</New>
+</FormTemplates>
+</file>
+
+<file path=customXml/item2.xml><?xml version="1.0" encoding="utf-8"?>
+<p:properties xmlns:p="http://schemas.microsoft.com/office/2006/metadata/properties" xmlns:xsi="http://www.w3.org/2001/XMLSchema-instance" xmlns:pc="http://schemas.microsoft.com/office/infopath/2007/PartnerControls">
+  <documentManagement>
+    <_ip_UnifiedCompliancePolicyUIAction xmlns="http://schemas.microsoft.com/sharepoint/v3" xsi:nil="true"/>
+    <Image xmlns="71af3243-3dd4-4a8d-8c0d-dd76da1f02a5">
+      <Url xsi:nil="true"/>
+      <Description xsi:nil="true"/>
+    </Image>
+    <Status xmlns="71af3243-3dd4-4a8d-8c0d-dd76da1f02a5">Not started</Status>
+    <Background xmlns="71af3243-3dd4-4a8d-8c0d-dd76da1f02a5">false</Background>
+    <_ip_UnifiedCompliancePolicyProperties xmlns="http://schemas.microsoft.com/sharepoint/v3" xsi:nil="true"/>
+    <ImageTagsTaxHTField xmlns="71af3243-3dd4-4a8d-8c0d-dd76da1f02a5">
+      <Terms xmlns="http://schemas.microsoft.com/office/infopath/2007/PartnerControls"/>
+    </ImageTagsTaxHTField>
+    <TaxCatchAll xmlns="230e9df3-be65-4c73-a93b-d1236ebd677e" xsi:nil="true"/>
+    <MediaServiceKeyPoints xmlns="71af3243-3dd4-4a8d-8c0d-dd76da1f02a5" xsi:nil="true"/>
+  </documentManagement>
+</p:properties>
+</file>
+
+<file path=customXml/item3.xml><?xml version="1.0" encoding="utf-8"?>
 <ct:contentTypeSchema xmlns:ct="http://schemas.microsoft.com/office/2006/metadata/contentType" xmlns:ma="http://schemas.microsoft.com/office/2006/metadata/properties/metaAttributes" ct:_="" ma:_="" ma:contentTypeName="Document" ma:contentTypeID="0x01010079F111ED35F8CC479449609E8A0923A6" ma:contentTypeVersion="28" ma:contentTypeDescription="Create a new document." ma:contentTypeScope="" ma:versionID="60f5a4f2d2b0abadcf532d48ebf9cb71">
   <xsd:schema xmlns:xsd="http://www.w3.org/2001/XMLSchema" xmlns:xs="http://www.w3.org/2001/XMLSchema" xmlns:p="http://schemas.microsoft.com/office/2006/metadata/properties" xmlns:ns1="http://schemas.microsoft.com/sharepoint/v3" xmlns:ns2="71af3243-3dd4-4a8d-8c0d-dd76da1f02a5" xmlns:ns3="16c05727-aa75-4e4a-9b5f-8a80a1165891" xmlns:ns4="230e9df3-be65-4c73-a93b-d1236ebd677e" targetNamespace="http://schemas.microsoft.com/office/2006/metadata/properties" ma:root="true" ma:fieldsID="7dd78129e6a1811f84807ad11c651531" ns1:_="" ns2:_="" ns3:_="" ns4:_="">
     <xsd:import namespace="http://schemas.microsoft.com/sharepoint/v3"/>
@@ -23100,52 +23354,10 @@
 </ct:contentTypeSchema>
 </file>
 
-<file path=customXml/item2.xml><?xml version="1.0" encoding="utf-8"?>
-<p:properties xmlns:p="http://schemas.microsoft.com/office/2006/metadata/properties" xmlns:xsi="http://www.w3.org/2001/XMLSchema-instance" xmlns:pc="http://schemas.microsoft.com/office/infopath/2007/PartnerControls">
-  <documentManagement>
-    <_ip_UnifiedCompliancePolicyUIAction xmlns="http://schemas.microsoft.com/sharepoint/v3" xsi:nil="true"/>
-    <Image xmlns="71af3243-3dd4-4a8d-8c0d-dd76da1f02a5">
-      <Url xsi:nil="true"/>
-      <Description xsi:nil="true"/>
-    </Image>
-    <Status xmlns="71af3243-3dd4-4a8d-8c0d-dd76da1f02a5">Not started</Status>
-    <Background xmlns="71af3243-3dd4-4a8d-8c0d-dd76da1f02a5">false</Background>
-    <_ip_UnifiedCompliancePolicyProperties xmlns="http://schemas.microsoft.com/sharepoint/v3" xsi:nil="true"/>
-    <ImageTagsTaxHTField xmlns="71af3243-3dd4-4a8d-8c0d-dd76da1f02a5">
-      <Terms xmlns="http://schemas.microsoft.com/office/infopath/2007/PartnerControls"/>
-    </ImageTagsTaxHTField>
-    <TaxCatchAll xmlns="230e9df3-be65-4c73-a93b-d1236ebd677e" xsi:nil="true"/>
-    <MediaServiceKeyPoints xmlns="71af3243-3dd4-4a8d-8c0d-dd76da1f02a5" xsi:nil="true"/>
-  </documentManagement>
-</p:properties>
-</file>
-
-<file path=customXml/item3.xml><?xml version="1.0" encoding="utf-8"?>
-<?mso-contentType ?>
-<FormTemplates xmlns="http://schemas.microsoft.com/sharepoint/v3/contenttype/forms">
-  <Display>DocumentLibraryForm</Display>
-  <Edit>DocumentLibraryForm</Edit>
-  <New>DocumentLibraryForm</New>
-</FormTemplates>
-</file>
-
 <file path=customXml/itemProps1.xml><?xml version="1.0" encoding="utf-8"?>
-<ds:datastoreItem xmlns:ds="http://schemas.openxmlformats.org/officeDocument/2006/customXml" ds:itemID="{797783A8-901D-4F73-81D7-AA6841BEB3D7}">
+<ds:datastoreItem xmlns:ds="http://schemas.openxmlformats.org/officeDocument/2006/customXml" ds:itemID="{2F49CD38-5B57-4682-9FCE-B9174068D0AE}">
   <ds:schemaRefs>
-    <ds:schemaRef ds:uri="http://schemas.microsoft.com/office/2006/metadata/contentType"/>
-    <ds:schemaRef ds:uri="http://schemas.microsoft.com/office/2006/metadata/properties/metaAttributes"/>
-    <ds:schemaRef ds:uri="http://www.w3.org/2001/XMLSchema"/>
-    <ds:schemaRef ds:uri="http://schemas.microsoft.com/office/2006/metadata/properties"/>
-    <ds:schemaRef ds:uri="http://schemas.microsoft.com/sharepoint/v3"/>
-    <ds:schemaRef ds:uri="71af3243-3dd4-4a8d-8c0d-dd76da1f02a5"/>
-    <ds:schemaRef ds:uri="16c05727-aa75-4e4a-9b5f-8a80a1165891"/>
-    <ds:schemaRef ds:uri="230e9df3-be65-4c73-a93b-d1236ebd677e"/>
-    <ds:schemaRef ds:uri="http://schemas.microsoft.com/office/2006/documentManagement/types"/>
-    <ds:schemaRef ds:uri="http://schemas.microsoft.com/office/infopath/2007/PartnerControls"/>
-    <ds:schemaRef ds:uri="http://schemas.openxmlformats.org/package/2006/metadata/core-properties"/>
-    <ds:schemaRef ds:uri="http://purl.org/dc/elements/1.1/"/>
-    <ds:schemaRef ds:uri="http://purl.org/dc/terms/"/>
-    <ds:schemaRef ds:uri="http://schemas.microsoft.com/internal/obd"/>
+    <ds:schemaRef ds:uri="http://schemas.microsoft.com/sharepoint/v3/contenttype/forms"/>
   </ds:schemaRefs>
 </ds:datastoreItem>
 </file>
@@ -23170,9 +23382,22 @@
 </file>
 
 <file path=customXml/itemProps3.xml><?xml version="1.0" encoding="utf-8"?>
-<ds:datastoreItem xmlns:ds="http://schemas.openxmlformats.org/officeDocument/2006/customXml" ds:itemID="{2F49CD38-5B57-4682-9FCE-B9174068D0AE}">
+<ds:datastoreItem xmlns:ds="http://schemas.openxmlformats.org/officeDocument/2006/customXml" ds:itemID="{797783A8-901D-4F73-81D7-AA6841BEB3D7}">
   <ds:schemaRefs>
-    <ds:schemaRef ds:uri="http://schemas.microsoft.com/sharepoint/v3/contenttype/forms"/>
+    <ds:schemaRef ds:uri="http://schemas.microsoft.com/office/2006/metadata/contentType"/>
+    <ds:schemaRef ds:uri="http://schemas.microsoft.com/office/2006/metadata/properties/metaAttributes"/>
+    <ds:schemaRef ds:uri="http://www.w3.org/2001/XMLSchema"/>
+    <ds:schemaRef ds:uri="http://schemas.microsoft.com/office/2006/metadata/properties"/>
+    <ds:schemaRef ds:uri="http://schemas.microsoft.com/sharepoint/v3"/>
+    <ds:schemaRef ds:uri="71af3243-3dd4-4a8d-8c0d-dd76da1f02a5"/>
+    <ds:schemaRef ds:uri="16c05727-aa75-4e4a-9b5f-8a80a1165891"/>
+    <ds:schemaRef ds:uri="230e9df3-be65-4c73-a93b-d1236ebd677e"/>
+    <ds:schemaRef ds:uri="http://schemas.microsoft.com/office/2006/documentManagement/types"/>
+    <ds:schemaRef ds:uri="http://schemas.microsoft.com/office/infopath/2007/PartnerControls"/>
+    <ds:schemaRef ds:uri="http://schemas.openxmlformats.org/package/2006/metadata/core-properties"/>
+    <ds:schemaRef ds:uri="http://purl.org/dc/elements/1.1/"/>
+    <ds:schemaRef ds:uri="http://purl.org/dc/terms/"/>
+    <ds:schemaRef ds:uri="http://schemas.microsoft.com/internal/obd"/>
   </ds:schemaRefs>
 </ds:datastoreItem>
 </file>

</xml_diff>